<commit_message>
Change presentation a little bit
</commit_message>
<xml_diff>
--- a/Documents/ПІ_checkIT.pptx
+++ b/Documents/ПІ_checkIT.pptx
@@ -8,10 +8,12 @@
     <p:sldId id="256" r:id="rId2"/>
     <p:sldId id="257" r:id="rId3"/>
     <p:sldId id="258" r:id="rId4"/>
-    <p:sldId id="259" r:id="rId5"/>
-    <p:sldId id="260" r:id="rId6"/>
-    <p:sldId id="262" r:id="rId7"/>
-    <p:sldId id="261" r:id="rId8"/>
+    <p:sldId id="264" r:id="rId5"/>
+    <p:sldId id="263" r:id="rId6"/>
+    <p:sldId id="259" r:id="rId7"/>
+    <p:sldId id="260" r:id="rId8"/>
+    <p:sldId id="262" r:id="rId9"/>
+    <p:sldId id="261" r:id="rId10"/>
   </p:sldIdLst>
   <p:sldSz cx="12192000" cy="6858000"/>
   <p:notesSz cx="6858000" cy="9144000"/>
@@ -110,6 +112,11 @@
       </a:defRPr>
     </a:lvl9pPr>
   </p:defaultTextStyle>
+  <p:extLst>
+    <p:ext uri="{EFAFB233-063F-42B5-8137-9DF3F51BA10A}">
+      <p15:sldGuideLst xmlns:p15="http://schemas.microsoft.com/office/powerpoint/2012/main"/>
+    </p:ext>
+  </p:extLst>
 </p:presentation>
 </file>
 
@@ -260,7 +267,7 @@
           <a:p>
             <a:fld id="{1C29D0AA-9A66-424E-B325-BFDB97FBEF5C}" type="datetimeFigureOut">
               <a:rPr lang="uk-UA" smtClean="0"/>
-              <a:t>10.09.2025</a:t>
+              <a:t>17.09.2025</a:t>
             </a:fld>
             <a:endParaRPr lang="uk-UA"/>
           </a:p>
@@ -458,7 +465,7 @@
           <a:p>
             <a:fld id="{1C29D0AA-9A66-424E-B325-BFDB97FBEF5C}" type="datetimeFigureOut">
               <a:rPr lang="uk-UA" smtClean="0"/>
-              <a:t>10.09.2025</a:t>
+              <a:t>17.09.2025</a:t>
             </a:fld>
             <a:endParaRPr lang="uk-UA"/>
           </a:p>
@@ -666,7 +673,7 @@
           <a:p>
             <a:fld id="{1C29D0AA-9A66-424E-B325-BFDB97FBEF5C}" type="datetimeFigureOut">
               <a:rPr lang="uk-UA" smtClean="0"/>
-              <a:t>10.09.2025</a:t>
+              <a:t>17.09.2025</a:t>
             </a:fld>
             <a:endParaRPr lang="uk-UA"/>
           </a:p>
@@ -864,7 +871,7 @@
           <a:p>
             <a:fld id="{1C29D0AA-9A66-424E-B325-BFDB97FBEF5C}" type="datetimeFigureOut">
               <a:rPr lang="uk-UA" smtClean="0"/>
-              <a:t>10.09.2025</a:t>
+              <a:t>17.09.2025</a:t>
             </a:fld>
             <a:endParaRPr lang="uk-UA"/>
           </a:p>
@@ -1139,7 +1146,7 @@
           <a:p>
             <a:fld id="{1C29D0AA-9A66-424E-B325-BFDB97FBEF5C}" type="datetimeFigureOut">
               <a:rPr lang="uk-UA" smtClean="0"/>
-              <a:t>10.09.2025</a:t>
+              <a:t>17.09.2025</a:t>
             </a:fld>
             <a:endParaRPr lang="uk-UA"/>
           </a:p>
@@ -1404,7 +1411,7 @@
           <a:p>
             <a:fld id="{1C29D0AA-9A66-424E-B325-BFDB97FBEF5C}" type="datetimeFigureOut">
               <a:rPr lang="uk-UA" smtClean="0"/>
-              <a:t>10.09.2025</a:t>
+              <a:t>17.09.2025</a:t>
             </a:fld>
             <a:endParaRPr lang="uk-UA"/>
           </a:p>
@@ -1816,7 +1823,7 @@
           <a:p>
             <a:fld id="{1C29D0AA-9A66-424E-B325-BFDB97FBEF5C}" type="datetimeFigureOut">
               <a:rPr lang="uk-UA" smtClean="0"/>
-              <a:t>10.09.2025</a:t>
+              <a:t>17.09.2025</a:t>
             </a:fld>
             <a:endParaRPr lang="uk-UA"/>
           </a:p>
@@ -1957,7 +1964,7 @@
           <a:p>
             <a:fld id="{1C29D0AA-9A66-424E-B325-BFDB97FBEF5C}" type="datetimeFigureOut">
               <a:rPr lang="uk-UA" smtClean="0"/>
-              <a:t>10.09.2025</a:t>
+              <a:t>17.09.2025</a:t>
             </a:fld>
             <a:endParaRPr lang="uk-UA"/>
           </a:p>
@@ -2070,7 +2077,7 @@
           <a:p>
             <a:fld id="{1C29D0AA-9A66-424E-B325-BFDB97FBEF5C}" type="datetimeFigureOut">
               <a:rPr lang="uk-UA" smtClean="0"/>
-              <a:t>10.09.2025</a:t>
+              <a:t>17.09.2025</a:t>
             </a:fld>
             <a:endParaRPr lang="uk-UA"/>
           </a:p>
@@ -2381,7 +2388,7 @@
           <a:p>
             <a:fld id="{1C29D0AA-9A66-424E-B325-BFDB97FBEF5C}" type="datetimeFigureOut">
               <a:rPr lang="uk-UA" smtClean="0"/>
-              <a:t>10.09.2025</a:t>
+              <a:t>17.09.2025</a:t>
             </a:fld>
             <a:endParaRPr lang="uk-UA"/>
           </a:p>
@@ -2669,7 +2676,7 @@
           <a:p>
             <a:fld id="{1C29D0AA-9A66-424E-B325-BFDB97FBEF5C}" type="datetimeFigureOut">
               <a:rPr lang="uk-UA" smtClean="0"/>
-              <a:t>10.09.2025</a:t>
+              <a:t>17.09.2025</a:t>
             </a:fld>
             <a:endParaRPr lang="uk-UA"/>
           </a:p>
@@ -2910,7 +2917,7 @@
           <a:p>
             <a:fld id="{1C29D0AA-9A66-424E-B325-BFDB97FBEF5C}" type="datetimeFigureOut">
               <a:rPr lang="uk-UA" smtClean="0"/>
-              <a:t>10.09.2025</a:t>
+              <a:t>17.09.2025</a:t>
             </a:fld>
             <a:endParaRPr lang="uk-UA"/>
           </a:p>
@@ -3508,6 +3515,126 @@
   <p:cSld>
     <p:spTree>
       <p:nvGrpSpPr>
+        <p:cNvPr id="1" name=""/>
+        <p:cNvGrpSpPr/>
+        <p:nvPr/>
+      </p:nvGrpSpPr>
+      <p:grpSpPr>
+        <a:xfrm>
+          <a:off x="0" y="0"/>
+          <a:ext cx="0" cy="0"/>
+          <a:chOff x="0" y="0"/>
+          <a:chExt cx="0" cy="0"/>
+        </a:xfrm>
+      </p:grpSpPr>
+      <p:pic>
+        <p:nvPicPr>
+          <p:cNvPr id="5" name="Рисунок 4">
+            <a:extLst>
+              <a:ext uri="{FF2B5EF4-FFF2-40B4-BE49-F238E27FC236}">
+                <a16:creationId xmlns:a16="http://schemas.microsoft.com/office/drawing/2014/main" id="{5A5B1D12-EB43-DB13-26EA-A0E3A377E30E}"/>
+              </a:ext>
+            </a:extLst>
+          </p:cNvPr>
+          <p:cNvPicPr>
+            <a:picLocks noChangeAspect="1"/>
+          </p:cNvPicPr>
+          <p:nvPr/>
+        </p:nvPicPr>
+        <p:blipFill>
+          <a:blip r:embed="rId2"/>
+          <a:stretch>
+            <a:fillRect/>
+          </a:stretch>
+        </p:blipFill>
+        <p:spPr>
+          <a:xfrm>
+            <a:off x="0" y="-13944"/>
+            <a:ext cx="12192000" cy="6885887"/>
+          </a:xfrm>
+          <a:prstGeom prst="rect">
+            <a:avLst/>
+          </a:prstGeom>
+        </p:spPr>
+      </p:pic>
+    </p:spTree>
+    <p:extLst>
+      <p:ext uri="{BB962C8B-B14F-4D97-AF65-F5344CB8AC3E}">
+        <p14:creationId xmlns:p14="http://schemas.microsoft.com/office/powerpoint/2010/main" val="307259826"/>
+      </p:ext>
+    </p:extLst>
+  </p:cSld>
+  <p:clrMapOvr>
+    <a:masterClrMapping/>
+  </p:clrMapOvr>
+</p:sld>
+</file>
+
+<file path=ppt/slides/slide5.xml><?xml version="1.0" encoding="utf-8"?>
+<p:sld xmlns:a="http://schemas.openxmlformats.org/drawingml/2006/main" xmlns:r="http://schemas.openxmlformats.org/officeDocument/2006/relationships" xmlns:p="http://schemas.openxmlformats.org/presentationml/2006/main">
+  <p:cSld>
+    <p:spTree>
+      <p:nvGrpSpPr>
+        <p:cNvPr id="1" name=""/>
+        <p:cNvGrpSpPr/>
+        <p:nvPr/>
+      </p:nvGrpSpPr>
+      <p:grpSpPr>
+        <a:xfrm>
+          <a:off x="0" y="0"/>
+          <a:ext cx="0" cy="0"/>
+          <a:chOff x="0" y="0"/>
+          <a:chExt cx="0" cy="0"/>
+        </a:xfrm>
+      </p:grpSpPr>
+      <p:pic>
+        <p:nvPicPr>
+          <p:cNvPr id="5" name="Рисунок 4">
+            <a:extLst>
+              <a:ext uri="{FF2B5EF4-FFF2-40B4-BE49-F238E27FC236}">
+                <a16:creationId xmlns:a16="http://schemas.microsoft.com/office/drawing/2014/main" id="{B1A43F26-6AF9-5007-A3B3-9CD1E43B37A8}"/>
+              </a:ext>
+            </a:extLst>
+          </p:cNvPr>
+          <p:cNvPicPr>
+            <a:picLocks noChangeAspect="1"/>
+          </p:cNvPicPr>
+          <p:nvPr/>
+        </p:nvPicPr>
+        <p:blipFill>
+          <a:blip r:embed="rId2"/>
+          <a:stretch>
+            <a:fillRect/>
+          </a:stretch>
+        </p:blipFill>
+        <p:spPr>
+          <a:xfrm>
+            <a:off x="0" y="-14999"/>
+            <a:ext cx="12192000" cy="6888000"/>
+          </a:xfrm>
+          <a:prstGeom prst="rect">
+            <a:avLst/>
+          </a:prstGeom>
+        </p:spPr>
+      </p:pic>
+    </p:spTree>
+    <p:extLst>
+      <p:ext uri="{BB962C8B-B14F-4D97-AF65-F5344CB8AC3E}">
+        <p14:creationId xmlns:p14="http://schemas.microsoft.com/office/powerpoint/2010/main" val="1903383735"/>
+      </p:ext>
+    </p:extLst>
+  </p:cSld>
+  <p:clrMapOvr>
+    <a:masterClrMapping/>
+  </p:clrMapOvr>
+</p:sld>
+</file>
+
+<file path=ppt/slides/slide6.xml><?xml version="1.0" encoding="utf-8"?>
+<p:sld xmlns:a="http://schemas.openxmlformats.org/drawingml/2006/main" xmlns:r="http://schemas.openxmlformats.org/officeDocument/2006/relationships" xmlns:p="http://schemas.openxmlformats.org/presentationml/2006/main">
+  <p:cSld>
+    <p:spTree>
+      <p:nvGrpSpPr>
         <p:cNvPr id="1" name="">
           <a:extLst>
             <a:ext uri="{FF2B5EF4-FFF2-40B4-BE49-F238E27FC236}">
@@ -3528,10 +3655,10 @@
       </p:grpSpPr>
       <p:pic>
         <p:nvPicPr>
-          <p:cNvPr id="3" name="Рисунок 2">
-            <a:extLst>
-              <a:ext uri="{FF2B5EF4-FFF2-40B4-BE49-F238E27FC236}">
-                <a16:creationId xmlns:a16="http://schemas.microsoft.com/office/drawing/2014/main" id="{E186D426-DC94-8060-4A04-0B6FA0B43028}"/>
+          <p:cNvPr id="4" name="Рисунок 3">
+            <a:extLst>
+              <a:ext uri="{FF2B5EF4-FFF2-40B4-BE49-F238E27FC236}">
+                <a16:creationId xmlns:a16="http://schemas.microsoft.com/office/drawing/2014/main" id="{F78858C4-7B7D-9F8E-BC24-CF0EFE58F0D9}"/>
               </a:ext>
             </a:extLst>
           </p:cNvPr>
@@ -3548,8 +3675,8 @@
         </p:blipFill>
         <p:spPr>
           <a:xfrm>
-            <a:off x="0" y="-12388"/>
-            <a:ext cx="12192000" cy="6882775"/>
+            <a:off x="0" y="18357"/>
+            <a:ext cx="12224811" cy="6839643"/>
           </a:xfrm>
           <a:prstGeom prst="rect">
             <a:avLst/>
@@ -3569,7 +3696,7 @@
 </p:sld>
 </file>
 
-<file path=ppt/slides/slide5.xml><?xml version="1.0" encoding="utf-8"?>
+<file path=ppt/slides/slide7.xml><?xml version="1.0" encoding="utf-8"?>
 <p:sld xmlns:a="http://schemas.openxmlformats.org/drawingml/2006/main" xmlns:r="http://schemas.openxmlformats.org/officeDocument/2006/relationships" xmlns:p="http://schemas.openxmlformats.org/presentationml/2006/main">
   <p:cSld>
     <p:spTree>
@@ -3635,7 +3762,7 @@
 </p:sld>
 </file>
 
-<file path=ppt/slides/slide6.xml><?xml version="1.0" encoding="utf-8"?>
+<file path=ppt/slides/slide8.xml><?xml version="1.0" encoding="utf-8"?>
 <p:sld xmlns:a="http://schemas.openxmlformats.org/drawingml/2006/main" xmlns:r="http://schemas.openxmlformats.org/officeDocument/2006/relationships" xmlns:p="http://schemas.openxmlformats.org/presentationml/2006/main">
   <p:cSld>
     <p:spTree>
@@ -3701,7 +3828,7 @@
 </p:sld>
 </file>
 
-<file path=ppt/slides/slide7.xml><?xml version="1.0" encoding="utf-8"?>
+<file path=ppt/slides/slide9.xml><?xml version="1.0" encoding="utf-8"?>
 <p:sld xmlns:a="http://schemas.openxmlformats.org/drawingml/2006/main" xmlns:r="http://schemas.openxmlformats.org/officeDocument/2006/relationships" xmlns:p="http://schemas.openxmlformats.org/presentationml/2006/main">
   <p:cSld>
     <p:spTree>

</xml_diff>